<commit_message>
NX product line files added
</commit_message>
<xml_diff>
--- a/00_Presentations/Sprint 3.pptx
+++ b/00_Presentations/Sprint 3.pptx
@@ -15,8 +15,8 @@
     <p:sldId id="257" r:id="rId6"/>
     <p:sldId id="289" r:id="rId7"/>
     <p:sldId id="296" r:id="rId8"/>
-    <p:sldId id="298" r:id="rId9"/>
-    <p:sldId id="295" r:id="rId10"/>
+    <p:sldId id="295" r:id="rId9"/>
+    <p:sldId id="298" r:id="rId10"/>
     <p:sldId id="297" r:id="rId11"/>
   </p:sldIdLst>
   <p:sldSz cx="12192000" cy="6858000"/>
@@ -4208,81 +4208,6 @@
           <a:bodyPr/>
           <a:lstStyle/>
           <a:p>
-            <a:pPr marL="171450" indent="-171450">
-              <a:buFont typeface="Arial" panose="020B0604020202020204" pitchFamily="34" charset="0"/>
-              <a:buChar char="•"/>
-            </a:pPr>
-            <a:r>
-              <a:rPr lang="en-US" dirty="0"/>
-              <a:t>I’m overall very satisfied with my results within this project. I gained allot of knowledge about simulations. </a:t>
-            </a:r>
-          </a:p>
-          <a:p>
-            <a:pPr marL="171450" indent="-171450">
-              <a:buFont typeface="Arial" panose="020B0604020202020204" pitchFamily="34" charset="0"/>
-              <a:buChar char="•"/>
-            </a:pPr>
-            <a:r>
-              <a:rPr lang="en-US" dirty="0"/>
-              <a:t>I’m more aware about the steps that I need to take to get to a solution and solve a problem.</a:t>
-            </a:r>
-          </a:p>
-          <a:p>
-            <a:pPr marL="171450" indent="-171450">
-              <a:buFont typeface="Arial" panose="020B0604020202020204" pitchFamily="34" charset="0"/>
-              <a:buChar char="•"/>
-            </a:pPr>
-            <a:r>
-              <a:rPr lang="en-US" dirty="0"/>
-              <a:t>Overall, my time management was very good. But often I still find myself getting too focused on specific solutions, which can make it difficult to consider other possibilities.</a:t>
-            </a:r>
-          </a:p>
-          <a:p>
-            <a:pPr marL="171450" indent="-171450">
-              <a:buFont typeface="Arial" panose="020B0604020202020204" pitchFamily="34" charset="0"/>
-              <a:buChar char="•"/>
-            </a:pPr>
-            <a:r>
-              <a:rPr lang="en-US" dirty="0"/>
-              <a:t>Fix the human resource transfers</a:t>
-            </a:r>
-          </a:p>
-          <a:p>
-            <a:pPr marL="171450" indent="-171450">
-              <a:buFont typeface="Arial" panose="020B0604020202020204" pitchFamily="34" charset="0"/>
-              <a:buChar char="•"/>
-            </a:pPr>
-            <a:r>
-              <a:rPr lang="en-US" dirty="0"/>
-              <a:t>This project is a good addition show my learning outcomes. </a:t>
-            </a:r>
-          </a:p>
-          <a:p>
-            <a:pPr marL="171450" indent="-171450">
-              <a:buFont typeface="Arial" panose="020B0604020202020204" pitchFamily="34" charset="0"/>
-              <a:buChar char="•"/>
-            </a:pPr>
-            <a:endParaRPr lang="en-US" dirty="0"/>
-          </a:p>
-          <a:p>
-            <a:pPr marL="171450" indent="-171450">
-              <a:buFont typeface="Arial" panose="020B0604020202020204" pitchFamily="34" charset="0"/>
-              <a:buChar char="•"/>
-            </a:pPr>
-            <a:endParaRPr lang="en-US" dirty="0"/>
-          </a:p>
-          <a:p>
-            <a:pPr marL="171450" indent="-171450">
-              <a:buFont typeface="Arial" panose="020B0604020202020204" pitchFamily="34" charset="0"/>
-              <a:buChar char="•"/>
-            </a:pPr>
-            <a:endParaRPr lang="en-US" dirty="0"/>
-          </a:p>
-          <a:p>
-            <a:pPr marL="171450" indent="-171450">
-              <a:buFont typeface="Arial" panose="020B0604020202020204" pitchFamily="34" charset="0"/>
-              <a:buChar char="•"/>
-            </a:pPr>
             <a:endParaRPr lang="en-US" dirty="0"/>
           </a:p>
         </p:txBody>
@@ -4313,7 +4238,7 @@
     </p:spTree>
     <p:extLst>
       <p:ext uri="{BB962C8B-B14F-4D97-AF65-F5344CB8AC3E}">
-        <p14:creationId xmlns:p14="http://schemas.microsoft.com/office/powerpoint/2010/main" val="4194793359"/>
+        <p14:creationId xmlns:p14="http://schemas.microsoft.com/office/powerpoint/2010/main" val="2474778719"/>
       </p:ext>
     </p:extLst>
   </p:cSld>
@@ -4367,6 +4292,81 @@
           <a:bodyPr/>
           <a:lstStyle/>
           <a:p>
+            <a:pPr marL="171450" indent="-171450">
+              <a:buFont typeface="Arial" panose="020B0604020202020204" pitchFamily="34" charset="0"/>
+              <a:buChar char="•"/>
+            </a:pPr>
+            <a:r>
+              <a:rPr lang="en-US" dirty="0"/>
+              <a:t>I’m overall very satisfied with my results within this project. I gained allot of knowledge about simulations. </a:t>
+            </a:r>
+          </a:p>
+          <a:p>
+            <a:pPr marL="171450" indent="-171450">
+              <a:buFont typeface="Arial" panose="020B0604020202020204" pitchFamily="34" charset="0"/>
+              <a:buChar char="•"/>
+            </a:pPr>
+            <a:r>
+              <a:rPr lang="en-US" dirty="0"/>
+              <a:t>I’m more aware about the steps that I need to take to get to a solution and solve a problem.</a:t>
+            </a:r>
+          </a:p>
+          <a:p>
+            <a:pPr marL="171450" indent="-171450">
+              <a:buFont typeface="Arial" panose="020B0604020202020204" pitchFamily="34" charset="0"/>
+              <a:buChar char="•"/>
+            </a:pPr>
+            <a:r>
+              <a:rPr lang="en-US" dirty="0"/>
+              <a:t>Overall, my time management was very good. But often I still find myself getting too focused on specific solutions, which can make it difficult to consider other possibilities.</a:t>
+            </a:r>
+          </a:p>
+          <a:p>
+            <a:pPr marL="171450" indent="-171450">
+              <a:buFont typeface="Arial" panose="020B0604020202020204" pitchFamily="34" charset="0"/>
+              <a:buChar char="•"/>
+            </a:pPr>
+            <a:r>
+              <a:rPr lang="en-US" dirty="0"/>
+              <a:t>Fix the human resource transfers</a:t>
+            </a:r>
+          </a:p>
+          <a:p>
+            <a:pPr marL="171450" indent="-171450">
+              <a:buFont typeface="Arial" panose="020B0604020202020204" pitchFamily="34" charset="0"/>
+              <a:buChar char="•"/>
+            </a:pPr>
+            <a:r>
+              <a:rPr lang="en-US" dirty="0"/>
+              <a:t>This project is a good addition show my learning outcomes. </a:t>
+            </a:r>
+          </a:p>
+          <a:p>
+            <a:pPr marL="171450" indent="-171450">
+              <a:buFont typeface="Arial" panose="020B0604020202020204" pitchFamily="34" charset="0"/>
+              <a:buChar char="•"/>
+            </a:pPr>
+            <a:endParaRPr lang="en-US" dirty="0"/>
+          </a:p>
+          <a:p>
+            <a:pPr marL="171450" indent="-171450">
+              <a:buFont typeface="Arial" panose="020B0604020202020204" pitchFamily="34" charset="0"/>
+              <a:buChar char="•"/>
+            </a:pPr>
+            <a:endParaRPr lang="en-US" dirty="0"/>
+          </a:p>
+          <a:p>
+            <a:pPr marL="171450" indent="-171450">
+              <a:buFont typeface="Arial" panose="020B0604020202020204" pitchFamily="34" charset="0"/>
+              <a:buChar char="•"/>
+            </a:pPr>
+            <a:endParaRPr lang="en-US" dirty="0"/>
+          </a:p>
+          <a:p>
+            <a:pPr marL="171450" indent="-171450">
+              <a:buFont typeface="Arial" panose="020B0604020202020204" pitchFamily="34" charset="0"/>
+              <a:buChar char="•"/>
+            </a:pPr>
             <a:endParaRPr lang="en-US" dirty="0"/>
           </a:p>
         </p:txBody>
@@ -4397,7 +4397,7 @@
     </p:spTree>
     <p:extLst>
       <p:ext uri="{BB962C8B-B14F-4D97-AF65-F5344CB8AC3E}">
-        <p14:creationId xmlns:p14="http://schemas.microsoft.com/office/powerpoint/2010/main" val="2474778719"/>
+        <p14:creationId xmlns:p14="http://schemas.microsoft.com/office/powerpoint/2010/main" val="4194793359"/>
       </p:ext>
     </p:extLst>
   </p:cSld>
@@ -12393,7 +12393,7 @@
             </a:pPr>
             <a:r>
               <a:rPr lang="en-US" dirty="0"/>
-              <a:t>Reflection</a:t>
+              <a:t>Demo UC4</a:t>
             </a:r>
           </a:p>
           <a:p>
@@ -12403,7 +12403,7 @@
             </a:pPr>
             <a:r>
               <a:rPr lang="en-US" dirty="0"/>
-              <a:t>Demo UC4</a:t>
+              <a:t>Reflection</a:t>
             </a:r>
           </a:p>
           <a:p>
@@ -12940,189 +12940,6 @@
       </p:grpSpPr>
       <p:sp>
         <p:nvSpPr>
-          <p:cNvPr id="5" name="Title 4">
-            <a:extLst>
-              <a:ext uri="{FF2B5EF4-FFF2-40B4-BE49-F238E27FC236}">
-                <a16:creationId xmlns:a16="http://schemas.microsoft.com/office/drawing/2014/main" id="{7FF5EE67-DE83-C00F-F31C-58A2B46234DB}"/>
-              </a:ext>
-            </a:extLst>
-          </p:cNvPr>
-          <p:cNvSpPr>
-            <a:spLocks noGrp="1"/>
-          </p:cNvSpPr>
-          <p:nvPr>
-            <p:ph type="title"/>
-          </p:nvPr>
-        </p:nvSpPr>
-        <p:spPr>
-          <a:xfrm>
-            <a:off x="1167492" y="45085"/>
-            <a:ext cx="9779183" cy="1600835"/>
-          </a:xfrm>
-        </p:spPr>
-        <p:txBody>
-          <a:bodyPr anchor="b">
-            <a:normAutofit/>
-          </a:bodyPr>
-          <a:lstStyle/>
-          <a:p>
-            <a:r>
-              <a:rPr lang="en-US" dirty="0"/>
-              <a:t>Reflection</a:t>
-            </a:r>
-          </a:p>
-        </p:txBody>
-      </p:sp>
-      <p:sp>
-        <p:nvSpPr>
-          <p:cNvPr id="8" name="Footer Placeholder 7">
-            <a:extLst>
-              <a:ext uri="{FF2B5EF4-FFF2-40B4-BE49-F238E27FC236}">
-                <a16:creationId xmlns:a16="http://schemas.microsoft.com/office/drawing/2014/main" id="{F4D16B5D-D5F0-7AEE-35D8-F789A352700A}"/>
-              </a:ext>
-            </a:extLst>
-          </p:cNvPr>
-          <p:cNvSpPr>
-            <a:spLocks noGrp="1"/>
-          </p:cNvSpPr>
-          <p:nvPr>
-            <p:ph type="ftr" sz="quarter" idx="11"/>
-          </p:nvPr>
-        </p:nvSpPr>
-        <p:spPr>
-          <a:xfrm>
-            <a:off x="4038600" y="6356350"/>
-            <a:ext cx="4114800" cy="365125"/>
-          </a:xfrm>
-        </p:spPr>
-        <p:txBody>
-          <a:bodyPr anchor="ctr">
-            <a:normAutofit/>
-          </a:bodyPr>
-          <a:lstStyle/>
-          <a:p>
-            <a:pPr>
-              <a:spcAft>
-                <a:spcPts val="600"/>
-              </a:spcAft>
-            </a:pPr>
-            <a:r>
-              <a:rPr lang="nl-NL"/>
-              <a:t>Simulation - Joep van Dijk</a:t>
-            </a:r>
-            <a:endParaRPr lang="en-US" dirty="0"/>
-          </a:p>
-        </p:txBody>
-      </p:sp>
-      <p:sp>
-        <p:nvSpPr>
-          <p:cNvPr id="10" name="Slide Number Placeholder 9">
-            <a:extLst>
-              <a:ext uri="{FF2B5EF4-FFF2-40B4-BE49-F238E27FC236}">
-                <a16:creationId xmlns:a16="http://schemas.microsoft.com/office/drawing/2014/main" id="{624EECC7-C490-579A-EE54-EFAED17A4FF7}"/>
-              </a:ext>
-            </a:extLst>
-          </p:cNvPr>
-          <p:cNvSpPr>
-            <a:spLocks noGrp="1"/>
-          </p:cNvSpPr>
-          <p:nvPr>
-            <p:ph type="sldNum" sz="quarter" idx="12"/>
-          </p:nvPr>
-        </p:nvSpPr>
-        <p:spPr>
-          <a:xfrm>
-            <a:off x="10206318" y="6356350"/>
-            <a:ext cx="1604682" cy="365125"/>
-          </a:xfrm>
-        </p:spPr>
-        <p:txBody>
-          <a:bodyPr anchor="ctr">
-            <a:normAutofit/>
-          </a:bodyPr>
-          <a:lstStyle/>
-          <a:p>
-            <a:pPr>
-              <a:spcAft>
-                <a:spcPts val="600"/>
-              </a:spcAft>
-            </a:pPr>
-            <a:fld id="{294A09A9-5501-47C1-A89A-A340965A2BE2}" type="slidenum">
-              <a:rPr lang="en-US" smtClean="0"/>
-              <a:pPr>
-                <a:spcAft>
-                  <a:spcPts val="600"/>
-                </a:spcAft>
-              </a:pPr>
-              <a:t>5</a:t>
-            </a:fld>
-            <a:endParaRPr lang="en-US"/>
-          </a:p>
-        </p:txBody>
-      </p:sp>
-      <p:graphicFrame>
-        <p:nvGraphicFramePr>
-          <p:cNvPr id="14" name="Content Placeholder 2">
-            <a:extLst>
-              <a:ext uri="{FF2B5EF4-FFF2-40B4-BE49-F238E27FC236}">
-                <a16:creationId xmlns:a16="http://schemas.microsoft.com/office/drawing/2014/main" id="{EA8CA754-714B-6A9A-725C-B3C116319A3F}"/>
-              </a:ext>
-            </a:extLst>
-          </p:cNvPr>
-          <p:cNvGraphicFramePr>
-            <a:graphicFrameLocks noGrp="1"/>
-          </p:cNvGraphicFramePr>
-          <p:nvPr>
-            <p:ph idx="14"/>
-            <p:extLst>
-              <p:ext uri="{D42A27DB-BD31-4B8C-83A1-F6EECF244321}">
-                <p14:modId xmlns:p14="http://schemas.microsoft.com/office/powerpoint/2010/main" val="1451488597"/>
-              </p:ext>
-            </p:extLst>
-          </p:nvPr>
-        </p:nvGraphicFramePr>
-        <p:xfrm>
-          <a:off x="1166087" y="2652713"/>
-          <a:ext cx="9780587" cy="3436936"/>
-        </p:xfrm>
-        <a:graphic>
-          <a:graphicData uri="http://schemas.openxmlformats.org/drawingml/2006/diagram">
-            <dgm:relIds xmlns:dgm="http://schemas.openxmlformats.org/drawingml/2006/diagram" xmlns:r="http://schemas.openxmlformats.org/officeDocument/2006/relationships" r:dm="rId3" r:lo="rId4" r:qs="rId5" r:cs="rId6"/>
-          </a:graphicData>
-        </a:graphic>
-      </p:graphicFrame>
-    </p:spTree>
-    <p:extLst>
-      <p:ext uri="{BB962C8B-B14F-4D97-AF65-F5344CB8AC3E}">
-        <p14:creationId xmlns:p14="http://schemas.microsoft.com/office/powerpoint/2010/main" val="1651182403"/>
-      </p:ext>
-    </p:extLst>
-  </p:cSld>
-  <p:clrMapOvr>
-    <a:masterClrMapping/>
-  </p:clrMapOvr>
-</p:sld>
-</file>
-
-<file path=ppt/slides/slide6.xml><?xml version="1.0" encoding="utf-8"?>
-<p:sld xmlns:a="http://schemas.openxmlformats.org/drawingml/2006/main" xmlns:r="http://schemas.openxmlformats.org/officeDocument/2006/relationships" xmlns:p="http://schemas.openxmlformats.org/presentationml/2006/main">
-  <p:cSld>
-    <p:spTree>
-      <p:nvGrpSpPr>
-        <p:cNvPr id="1" name=""/>
-        <p:cNvGrpSpPr/>
-        <p:nvPr/>
-      </p:nvGrpSpPr>
-      <p:grpSpPr>
-        <a:xfrm>
-          <a:off x="0" y="0"/>
-          <a:ext cx="0" cy="0"/>
-          <a:chOff x="0" y="0"/>
-          <a:chExt cx="0" cy="0"/>
-        </a:xfrm>
-      </p:grpSpPr>
-      <p:sp>
-        <p:nvSpPr>
           <p:cNvPr id="2" name="Title 1">
             <a:extLst>
               <a:ext uri="{FF2B5EF4-FFF2-40B4-BE49-F238E27FC236}">
@@ -13206,7 +13023,7 @@
             <a:fld id="{294A09A9-5501-47C1-A89A-A340965A2BE2}" type="slidenum">
               <a:rPr lang="en-US" smtClean="0"/>
               <a:pPr/>
-              <a:t>6</a:t>
+              <a:t>5</a:t>
             </a:fld>
             <a:endParaRPr lang="en-US" dirty="0"/>
           </a:p>
@@ -13294,6 +13111,189 @@
     <p:extLst>
       <p:ext uri="{BB962C8B-B14F-4D97-AF65-F5344CB8AC3E}">
         <p14:creationId xmlns:p14="http://schemas.microsoft.com/office/powerpoint/2010/main" val="907915534"/>
+      </p:ext>
+    </p:extLst>
+  </p:cSld>
+  <p:clrMapOvr>
+    <a:masterClrMapping/>
+  </p:clrMapOvr>
+</p:sld>
+</file>
+
+<file path=ppt/slides/slide6.xml><?xml version="1.0" encoding="utf-8"?>
+<p:sld xmlns:a="http://schemas.openxmlformats.org/drawingml/2006/main" xmlns:r="http://schemas.openxmlformats.org/officeDocument/2006/relationships" xmlns:p="http://schemas.openxmlformats.org/presentationml/2006/main">
+  <p:cSld>
+    <p:spTree>
+      <p:nvGrpSpPr>
+        <p:cNvPr id="1" name=""/>
+        <p:cNvGrpSpPr/>
+        <p:nvPr/>
+      </p:nvGrpSpPr>
+      <p:grpSpPr>
+        <a:xfrm>
+          <a:off x="0" y="0"/>
+          <a:ext cx="0" cy="0"/>
+          <a:chOff x="0" y="0"/>
+          <a:chExt cx="0" cy="0"/>
+        </a:xfrm>
+      </p:grpSpPr>
+      <p:sp>
+        <p:nvSpPr>
+          <p:cNvPr id="5" name="Title 4">
+            <a:extLst>
+              <a:ext uri="{FF2B5EF4-FFF2-40B4-BE49-F238E27FC236}">
+                <a16:creationId xmlns:a16="http://schemas.microsoft.com/office/drawing/2014/main" id="{7FF5EE67-DE83-C00F-F31C-58A2B46234DB}"/>
+              </a:ext>
+            </a:extLst>
+          </p:cNvPr>
+          <p:cNvSpPr>
+            <a:spLocks noGrp="1"/>
+          </p:cNvSpPr>
+          <p:nvPr>
+            <p:ph type="title"/>
+          </p:nvPr>
+        </p:nvSpPr>
+        <p:spPr>
+          <a:xfrm>
+            <a:off x="1167492" y="45085"/>
+            <a:ext cx="9779183" cy="1600835"/>
+          </a:xfrm>
+        </p:spPr>
+        <p:txBody>
+          <a:bodyPr anchor="b">
+            <a:normAutofit/>
+          </a:bodyPr>
+          <a:lstStyle/>
+          <a:p>
+            <a:r>
+              <a:rPr lang="en-US" dirty="0"/>
+              <a:t>Reflection</a:t>
+            </a:r>
+          </a:p>
+        </p:txBody>
+      </p:sp>
+      <p:sp>
+        <p:nvSpPr>
+          <p:cNvPr id="8" name="Footer Placeholder 7">
+            <a:extLst>
+              <a:ext uri="{FF2B5EF4-FFF2-40B4-BE49-F238E27FC236}">
+                <a16:creationId xmlns:a16="http://schemas.microsoft.com/office/drawing/2014/main" id="{F4D16B5D-D5F0-7AEE-35D8-F789A352700A}"/>
+              </a:ext>
+            </a:extLst>
+          </p:cNvPr>
+          <p:cNvSpPr>
+            <a:spLocks noGrp="1"/>
+          </p:cNvSpPr>
+          <p:nvPr>
+            <p:ph type="ftr" sz="quarter" idx="11"/>
+          </p:nvPr>
+        </p:nvSpPr>
+        <p:spPr>
+          <a:xfrm>
+            <a:off x="4038600" y="6356350"/>
+            <a:ext cx="4114800" cy="365125"/>
+          </a:xfrm>
+        </p:spPr>
+        <p:txBody>
+          <a:bodyPr anchor="ctr">
+            <a:normAutofit/>
+          </a:bodyPr>
+          <a:lstStyle/>
+          <a:p>
+            <a:pPr>
+              <a:spcAft>
+                <a:spcPts val="600"/>
+              </a:spcAft>
+            </a:pPr>
+            <a:r>
+              <a:rPr lang="nl-NL"/>
+              <a:t>Simulation - Joep van Dijk</a:t>
+            </a:r>
+            <a:endParaRPr lang="en-US" dirty="0"/>
+          </a:p>
+        </p:txBody>
+      </p:sp>
+      <p:sp>
+        <p:nvSpPr>
+          <p:cNvPr id="10" name="Slide Number Placeholder 9">
+            <a:extLst>
+              <a:ext uri="{FF2B5EF4-FFF2-40B4-BE49-F238E27FC236}">
+                <a16:creationId xmlns:a16="http://schemas.microsoft.com/office/drawing/2014/main" id="{624EECC7-C490-579A-EE54-EFAED17A4FF7}"/>
+              </a:ext>
+            </a:extLst>
+          </p:cNvPr>
+          <p:cNvSpPr>
+            <a:spLocks noGrp="1"/>
+          </p:cNvSpPr>
+          <p:nvPr>
+            <p:ph type="sldNum" sz="quarter" idx="12"/>
+          </p:nvPr>
+        </p:nvSpPr>
+        <p:spPr>
+          <a:xfrm>
+            <a:off x="10206318" y="6356350"/>
+            <a:ext cx="1604682" cy="365125"/>
+          </a:xfrm>
+        </p:spPr>
+        <p:txBody>
+          <a:bodyPr anchor="ctr">
+            <a:normAutofit/>
+          </a:bodyPr>
+          <a:lstStyle/>
+          <a:p>
+            <a:pPr>
+              <a:spcAft>
+                <a:spcPts val="600"/>
+              </a:spcAft>
+            </a:pPr>
+            <a:fld id="{294A09A9-5501-47C1-A89A-A340965A2BE2}" type="slidenum">
+              <a:rPr lang="en-US" smtClean="0"/>
+              <a:pPr>
+                <a:spcAft>
+                  <a:spcPts val="600"/>
+                </a:spcAft>
+              </a:pPr>
+              <a:t>6</a:t>
+            </a:fld>
+            <a:endParaRPr lang="en-US"/>
+          </a:p>
+        </p:txBody>
+      </p:sp>
+      <p:graphicFrame>
+        <p:nvGraphicFramePr>
+          <p:cNvPr id="14" name="Content Placeholder 2">
+            <a:extLst>
+              <a:ext uri="{FF2B5EF4-FFF2-40B4-BE49-F238E27FC236}">
+                <a16:creationId xmlns:a16="http://schemas.microsoft.com/office/drawing/2014/main" id="{EA8CA754-714B-6A9A-725C-B3C116319A3F}"/>
+              </a:ext>
+            </a:extLst>
+          </p:cNvPr>
+          <p:cNvGraphicFramePr>
+            <a:graphicFrameLocks noGrp="1"/>
+          </p:cNvGraphicFramePr>
+          <p:nvPr>
+            <p:ph idx="14"/>
+            <p:extLst>
+              <p:ext uri="{D42A27DB-BD31-4B8C-83A1-F6EECF244321}">
+                <p14:modId xmlns:p14="http://schemas.microsoft.com/office/powerpoint/2010/main" val="1451488597"/>
+              </p:ext>
+            </p:extLst>
+          </p:nvPr>
+        </p:nvGraphicFramePr>
+        <p:xfrm>
+          <a:off x="1166087" y="2652713"/>
+          <a:ext cx="9780587" cy="3436936"/>
+        </p:xfrm>
+        <a:graphic>
+          <a:graphicData uri="http://schemas.openxmlformats.org/drawingml/2006/diagram">
+            <dgm:relIds xmlns:dgm="http://schemas.openxmlformats.org/drawingml/2006/diagram" xmlns:r="http://schemas.openxmlformats.org/officeDocument/2006/relationships" r:dm="rId3" r:lo="rId4" r:qs="rId5" r:cs="rId6"/>
+          </a:graphicData>
+        </a:graphic>
+      </p:graphicFrame>
+    </p:spTree>
+    <p:extLst>
+      <p:ext uri="{BB962C8B-B14F-4D97-AF65-F5344CB8AC3E}">
+        <p14:creationId xmlns:p14="http://schemas.microsoft.com/office/powerpoint/2010/main" val="1651182403"/>
       </p:ext>
     </p:extLst>
   </p:cSld>
@@ -14183,26 +14183,6 @@
 </file>
 
 <file path=customXml/item1.xml><?xml version="1.0" encoding="utf-8"?>
-<p:properties xmlns:p="http://schemas.microsoft.com/office/2006/metadata/properties" xmlns:xsi="http://www.w3.org/2001/XMLSchema-instance" xmlns:pc="http://schemas.microsoft.com/office/infopath/2007/PartnerControls">
-  <documentManagement>
-    <_ip_UnifiedCompliancePolicyUIAction xmlns="http://schemas.microsoft.com/sharepoint/v3" xsi:nil="true"/>
-    <Image xmlns="71af3243-3dd4-4a8d-8c0d-dd76da1f02a5">
-      <Url xsi:nil="true"/>
-      <Description xsi:nil="true"/>
-    </Image>
-    <Status xmlns="71af3243-3dd4-4a8d-8c0d-dd76da1f02a5">Not started</Status>
-    <Background xmlns="71af3243-3dd4-4a8d-8c0d-dd76da1f02a5">false</Background>
-    <_ip_UnifiedCompliancePolicyProperties xmlns="http://schemas.microsoft.com/sharepoint/v3" xsi:nil="true"/>
-    <ImageTagsTaxHTField xmlns="71af3243-3dd4-4a8d-8c0d-dd76da1f02a5">
-      <Terms xmlns="http://schemas.microsoft.com/office/infopath/2007/PartnerControls"/>
-    </ImageTagsTaxHTField>
-    <TaxCatchAll xmlns="230e9df3-be65-4c73-a93b-d1236ebd677e" xsi:nil="true"/>
-    <MediaServiceKeyPoints xmlns="71af3243-3dd4-4a8d-8c0d-dd76da1f02a5" xsi:nil="true"/>
-  </documentManagement>
-</p:properties>
-</file>
-
-<file path=customXml/item2.xml><?xml version="1.0" encoding="utf-8"?>
 <ct:contentTypeSchema xmlns:ct="http://schemas.microsoft.com/office/2006/metadata/contentType" xmlns:ma="http://schemas.microsoft.com/office/2006/metadata/properties/metaAttributes" ct:_="" ma:_="" ma:contentTypeName="Document" ma:contentTypeID="0x01010079F111ED35F8CC479449609E8A0923A6" ma:contentTypeVersion="28" ma:contentTypeDescription="Create a new document." ma:contentTypeScope="" ma:versionID="60f5a4f2d2b0abadcf532d48ebf9cb71">
   <xsd:schema xmlns:xsd="http://www.w3.org/2001/XMLSchema" xmlns:xs="http://www.w3.org/2001/XMLSchema" xmlns:p="http://schemas.microsoft.com/office/2006/metadata/properties" xmlns:ns1="http://schemas.microsoft.com/sharepoint/v3" xmlns:ns2="71af3243-3dd4-4a8d-8c0d-dd76da1f02a5" xmlns:ns3="16c05727-aa75-4e4a-9b5f-8a80a1165891" xmlns:ns4="230e9df3-be65-4c73-a93b-d1236ebd677e" targetNamespace="http://schemas.microsoft.com/office/2006/metadata/properties" ma:root="true" ma:fieldsID="7dd78129e6a1811f84807ad11c651531" ns1:_="" ns2:_="" ns3:_="" ns4:_="">
     <xsd:import namespace="http://schemas.microsoft.com/sharepoint/v3"/>
@@ -14514,6 +14494,26 @@
 </ct:contentTypeSchema>
 </file>
 
+<file path=customXml/item2.xml><?xml version="1.0" encoding="utf-8"?>
+<p:properties xmlns:p="http://schemas.microsoft.com/office/2006/metadata/properties" xmlns:xsi="http://www.w3.org/2001/XMLSchema-instance" xmlns:pc="http://schemas.microsoft.com/office/infopath/2007/PartnerControls">
+  <documentManagement>
+    <_ip_UnifiedCompliancePolicyUIAction xmlns="http://schemas.microsoft.com/sharepoint/v3" xsi:nil="true"/>
+    <Image xmlns="71af3243-3dd4-4a8d-8c0d-dd76da1f02a5">
+      <Url xsi:nil="true"/>
+      <Description xsi:nil="true"/>
+    </Image>
+    <Status xmlns="71af3243-3dd4-4a8d-8c0d-dd76da1f02a5">Not started</Status>
+    <Background xmlns="71af3243-3dd4-4a8d-8c0d-dd76da1f02a5">false</Background>
+    <_ip_UnifiedCompliancePolicyProperties xmlns="http://schemas.microsoft.com/sharepoint/v3" xsi:nil="true"/>
+    <ImageTagsTaxHTField xmlns="71af3243-3dd4-4a8d-8c0d-dd76da1f02a5">
+      <Terms xmlns="http://schemas.microsoft.com/office/infopath/2007/PartnerControls"/>
+    </ImageTagsTaxHTField>
+    <TaxCatchAll xmlns="230e9df3-be65-4c73-a93b-d1236ebd677e" xsi:nil="true"/>
+    <MediaServiceKeyPoints xmlns="71af3243-3dd4-4a8d-8c0d-dd76da1f02a5" xsi:nil="true"/>
+  </documentManagement>
+</p:properties>
+</file>
+
 <file path=customXml/item3.xml><?xml version="1.0" encoding="utf-8"?>
 <?mso-contentType ?>
 <FormTemplates xmlns="http://schemas.microsoft.com/sharepoint/v3/contenttype/forms">
@@ -14524,18 +14524,6 @@
 </file>
 
 <file path=customXml/itemProps1.xml><?xml version="1.0" encoding="utf-8"?>
-<ds:datastoreItem xmlns:ds="http://schemas.openxmlformats.org/officeDocument/2006/customXml" ds:itemID="{61E98C35-9ECE-4425-BCBA-00E118C705CE}">
-  <ds:schemaRefs>
-    <ds:schemaRef ds:uri="http://schemas.microsoft.com/office/2006/metadata/properties"/>
-    <ds:schemaRef ds:uri="http://schemas.microsoft.com/office/infopath/2007/PartnerControls"/>
-    <ds:schemaRef ds:uri="http://schemas.microsoft.com/sharepoint/v3"/>
-    <ds:schemaRef ds:uri="71af3243-3dd4-4a8d-8c0d-dd76da1f02a5"/>
-    <ds:schemaRef ds:uri="230e9df3-be65-4c73-a93b-d1236ebd677e"/>
-  </ds:schemaRefs>
-</ds:datastoreItem>
-</file>
-
-<file path=customXml/itemProps2.xml><?xml version="1.0" encoding="utf-8"?>
 <ds:datastoreItem xmlns:ds="http://schemas.openxmlformats.org/officeDocument/2006/customXml" ds:itemID="{5AA6A711-2C3F-4EC0-B88B-62D740851176}">
   <ds:schemaRefs>
     <ds:schemaRef ds:uri="http://schemas.microsoft.com/office/2006/metadata/contentType"/>
@@ -14556,6 +14544,18 @@
 </ds:datastoreItem>
 </file>
 
+<file path=customXml/itemProps2.xml><?xml version="1.0" encoding="utf-8"?>
+<ds:datastoreItem xmlns:ds="http://schemas.openxmlformats.org/officeDocument/2006/customXml" ds:itemID="{61E98C35-9ECE-4425-BCBA-00E118C705CE}">
+  <ds:schemaRefs>
+    <ds:schemaRef ds:uri="http://schemas.microsoft.com/office/2006/metadata/properties"/>
+    <ds:schemaRef ds:uri="http://schemas.microsoft.com/office/infopath/2007/PartnerControls"/>
+    <ds:schemaRef ds:uri="http://schemas.microsoft.com/sharepoint/v3"/>
+    <ds:schemaRef ds:uri="71af3243-3dd4-4a8d-8c0d-dd76da1f02a5"/>
+    <ds:schemaRef ds:uri="230e9df3-be65-4c73-a93b-d1236ebd677e"/>
+  </ds:schemaRefs>
+</ds:datastoreItem>
+</file>
+
 <file path=customXml/itemProps3.xml><?xml version="1.0" encoding="utf-8"?>
 <ds:datastoreItem xmlns:ds="http://schemas.openxmlformats.org/officeDocument/2006/customXml" ds:itemID="{45A8381C-73EB-48EA-B45F-7B7C8C7DF409}">
   <ds:schemaRefs>

</xml_diff>